<commit_message>
correcting name in the ppt
</commit_message>
<xml_diff>
--- a/Natural Language Processing (NLP) Application Capstone.pptx
+++ b/Natural Language Processing (NLP) Application Capstone.pptx
@@ -1189,6 +1189,13 @@
         </dgm:presLayoutVars>
       </dgm:prSet>
       <dgm:spPr/>
+      <dgm:t>
+        <a:bodyPr/>
+        <a:lstStyle/>
+        <a:p>
+          <a:endParaRPr lang="en-US"/>
+        </a:p>
+      </dgm:t>
     </dgm:pt>
     <dgm:pt modelId="{2F9A0571-2654-40D2-B1E4-83656F8BD15B}" type="pres">
       <dgm:prSet presAssocID="{81B9B0D2-EE58-4F52-BE6A-0FE35ABF75FE}" presName="node" presStyleLbl="node1" presStyleIdx="0" presStyleCnt="7">
@@ -1197,6 +1204,13 @@
         </dgm:presLayoutVars>
       </dgm:prSet>
       <dgm:spPr/>
+      <dgm:t>
+        <a:bodyPr/>
+        <a:lstStyle/>
+        <a:p>
+          <a:endParaRPr lang="en-US"/>
+        </a:p>
+      </dgm:t>
     </dgm:pt>
     <dgm:pt modelId="{A1C05025-7CC5-4A9D-B1C6-4656762C6D5D}" type="pres">
       <dgm:prSet presAssocID="{39E33F3E-48D4-4721-AAC0-D4CE87A38FBE}" presName="sibTrans" presStyleCnt="0"/>
@@ -1209,6 +1223,13 @@
         </dgm:presLayoutVars>
       </dgm:prSet>
       <dgm:spPr/>
+      <dgm:t>
+        <a:bodyPr/>
+        <a:lstStyle/>
+        <a:p>
+          <a:endParaRPr lang="en-US"/>
+        </a:p>
+      </dgm:t>
     </dgm:pt>
     <dgm:pt modelId="{672958F4-B6C9-467F-AF04-81C327233D91}" type="pres">
       <dgm:prSet presAssocID="{2545A58E-3883-402E-9ADD-E56D36D527A5}" presName="sibTrans" presStyleCnt="0"/>
@@ -1221,6 +1242,13 @@
         </dgm:presLayoutVars>
       </dgm:prSet>
       <dgm:spPr/>
+      <dgm:t>
+        <a:bodyPr/>
+        <a:lstStyle/>
+        <a:p>
+          <a:endParaRPr lang="en-US"/>
+        </a:p>
+      </dgm:t>
     </dgm:pt>
     <dgm:pt modelId="{A497D3A5-C58E-4A85-95DA-708707E0FA62}" type="pres">
       <dgm:prSet presAssocID="{C80A33AA-AB0B-4227-AD61-88D1649B04D3}" presName="sibTrans" presStyleCnt="0"/>
@@ -1233,6 +1261,13 @@
         </dgm:presLayoutVars>
       </dgm:prSet>
       <dgm:spPr/>
+      <dgm:t>
+        <a:bodyPr/>
+        <a:lstStyle/>
+        <a:p>
+          <a:endParaRPr lang="en-US"/>
+        </a:p>
+      </dgm:t>
     </dgm:pt>
     <dgm:pt modelId="{D3CBD0E5-BD6E-4EB1-AE07-8AB74EF62027}" type="pres">
       <dgm:prSet presAssocID="{1C6C65F7-F2D5-4F78-8A20-3989422C7660}" presName="sibTrans" presStyleCnt="0"/>
@@ -1245,6 +1280,13 @@
         </dgm:presLayoutVars>
       </dgm:prSet>
       <dgm:spPr/>
+      <dgm:t>
+        <a:bodyPr/>
+        <a:lstStyle/>
+        <a:p>
+          <a:endParaRPr lang="en-US"/>
+        </a:p>
+      </dgm:t>
     </dgm:pt>
     <dgm:pt modelId="{9EA4F650-067E-4FE1-90C8-2CA2C49BD05D}" type="pres">
       <dgm:prSet presAssocID="{ECAB8671-FE98-41ED-838E-B6D05E2E2709}" presName="sibTrans" presStyleCnt="0"/>
@@ -1257,6 +1299,13 @@
         </dgm:presLayoutVars>
       </dgm:prSet>
       <dgm:spPr/>
+      <dgm:t>
+        <a:bodyPr/>
+        <a:lstStyle/>
+        <a:p>
+          <a:endParaRPr lang="en-US"/>
+        </a:p>
+      </dgm:t>
     </dgm:pt>
     <dgm:pt modelId="{79D58B42-A4A8-4AE9-A69F-EDAC2274A2CB}" type="pres">
       <dgm:prSet presAssocID="{858536C2-C941-44B9-B54C-DAEE02EDB4E9}" presName="sibTrans" presStyleCnt="0"/>
@@ -1269,24 +1318,31 @@
         </dgm:presLayoutVars>
       </dgm:prSet>
       <dgm:spPr/>
+      <dgm:t>
+        <a:bodyPr/>
+        <a:lstStyle/>
+        <a:p>
+          <a:endParaRPr lang="en-US"/>
+        </a:p>
+      </dgm:t>
     </dgm:pt>
   </dgm:ptLst>
   <dgm:cxnLst>
+    <dgm:cxn modelId="{E7AB2C0C-898E-4A36-B525-1033B654E3FC}" srcId="{0384B876-2ECC-4919-B753-25BD0C66F198}" destId="{6CFEA388-2E94-447E-B0E1-80804056BD92}" srcOrd="1" destOrd="0" parTransId="{D652B254-0285-4404-B197-DD5A491BC449}" sibTransId="{2545A58E-3883-402E-9ADD-E56D36D527A5}"/>
+    <dgm:cxn modelId="{D499FC5A-B01B-4007-8250-8F168C7BB7D6}" srcId="{0384B876-2ECC-4919-B753-25BD0C66F198}" destId="{AF3DF9F4-2547-4323-B7D7-223C19B1A43A}" srcOrd="3" destOrd="0" parTransId="{D5068AA7-6823-402F-9C06-9492234072B7}" sibTransId="{1C6C65F7-F2D5-4F78-8A20-3989422C7660}"/>
+    <dgm:cxn modelId="{10635F91-5178-4E57-B4B1-998F80B1CD48}" type="presOf" srcId="{0384B876-2ECC-4919-B753-25BD0C66F198}" destId="{72143920-807F-4689-9FF9-372E7A4C34A5}" srcOrd="0" destOrd="0" presId="urn:microsoft.com/office/officeart/2005/8/layout/default"/>
+    <dgm:cxn modelId="{33825921-1C81-466E-AC46-DAAB27AA5107}" srcId="{0384B876-2ECC-4919-B753-25BD0C66F198}" destId="{81B9B0D2-EE58-4F52-BE6A-0FE35ABF75FE}" srcOrd="0" destOrd="0" parTransId="{B7CD213A-15A3-4129-932A-CA725AFE140F}" sibTransId="{39E33F3E-48D4-4721-AAC0-D4CE87A38FBE}"/>
+    <dgm:cxn modelId="{68C6DF1E-C084-4230-A514-F2C76D61C812}" type="presOf" srcId="{C8D6837F-0441-4CE7-9C66-A4F534EC4290}" destId="{F679943C-55DE-4373-B58D-C2FF6FC9302A}" srcOrd="0" destOrd="0" presId="urn:microsoft.com/office/officeart/2005/8/layout/default"/>
     <dgm:cxn modelId="{8AB62700-3BB2-42B4-B870-C9D70DB4E145}" srcId="{0384B876-2ECC-4919-B753-25BD0C66F198}" destId="{C8D6837F-0441-4CE7-9C66-A4F534EC4290}" srcOrd="5" destOrd="0" parTransId="{4F4E74E4-6C42-428A-8A78-E9DB1695E453}" sibTransId="{858536C2-C941-44B9-B54C-DAEE02EDB4E9}"/>
-    <dgm:cxn modelId="{E7AB2C0C-898E-4A36-B525-1033B654E3FC}" srcId="{0384B876-2ECC-4919-B753-25BD0C66F198}" destId="{6CFEA388-2E94-447E-B0E1-80804056BD92}" srcOrd="1" destOrd="0" parTransId="{D652B254-0285-4404-B197-DD5A491BC449}" sibTransId="{2545A58E-3883-402E-9ADD-E56D36D527A5}"/>
-    <dgm:cxn modelId="{68C6DF1E-C084-4230-A514-F2C76D61C812}" type="presOf" srcId="{C8D6837F-0441-4CE7-9C66-A4F534EC4290}" destId="{F679943C-55DE-4373-B58D-C2FF6FC9302A}" srcOrd="0" destOrd="0" presId="urn:microsoft.com/office/officeart/2005/8/layout/default"/>
-    <dgm:cxn modelId="{33825921-1C81-466E-AC46-DAAB27AA5107}" srcId="{0384B876-2ECC-4919-B753-25BD0C66F198}" destId="{81B9B0D2-EE58-4F52-BE6A-0FE35ABF75FE}" srcOrd="0" destOrd="0" parTransId="{B7CD213A-15A3-4129-932A-CA725AFE140F}" sibTransId="{39E33F3E-48D4-4721-AAC0-D4CE87A38FBE}"/>
+    <dgm:cxn modelId="{19259FAF-C165-48E4-A188-55C12DDD5035}" type="presOf" srcId="{FB1C249E-0A06-4AF8-A1D8-8192523D5D4D}" destId="{18216488-6ABF-4A95-B7DD-ED3E43E96631}" srcOrd="0" destOrd="0" presId="urn:microsoft.com/office/officeart/2005/8/layout/default"/>
+    <dgm:cxn modelId="{5D3596A7-9835-4853-98F2-5F8BFF73DF51}" type="presOf" srcId="{AF3DF9F4-2547-4323-B7D7-223C19B1A43A}" destId="{1F9EEC6F-3643-44F5-8D03-9E682034BCE1}" srcOrd="0" destOrd="0" presId="urn:microsoft.com/office/officeart/2005/8/layout/default"/>
+    <dgm:cxn modelId="{025C377F-4935-417A-9A5D-FC4860EFD2F5}" srcId="{0384B876-2ECC-4919-B753-25BD0C66F198}" destId="{F84DD07E-9DDD-4BF1-BF02-EA5563981EB3}" srcOrd="4" destOrd="0" parTransId="{363FCB3A-DF12-4A87-8A56-2ACF724EB491}" sibTransId="{ECAB8671-FE98-41ED-838E-B6D05E2E2709}"/>
+    <dgm:cxn modelId="{078C2B51-388D-46E5-BB64-2AA7C66006D5}" type="presOf" srcId="{6CFEA388-2E94-447E-B0E1-80804056BD92}" destId="{3FCBF05D-58D0-4BFE-87DA-7444BE66C628}" srcOrd="0" destOrd="0" presId="urn:microsoft.com/office/officeart/2005/8/layout/default"/>
+    <dgm:cxn modelId="{719AC4BF-B886-4E5F-B8AD-B80D4D8FCDB7}" srcId="{0384B876-2ECC-4919-B753-25BD0C66F198}" destId="{2594A9AC-59B6-4608-9FA1-703CC267B66D}" srcOrd="6" destOrd="0" parTransId="{9464DEFE-492B-41A7-B7FD-5DC002714510}" sibTransId="{170ECE72-2A32-475B-9209-DAA952965592}"/>
+    <dgm:cxn modelId="{46A07189-BF6E-4EA8-BA41-4D7557AF2E56}" type="presOf" srcId="{F84DD07E-9DDD-4BF1-BF02-EA5563981EB3}" destId="{C5F34CE7-E4CD-4EF7-B1F5-84C0C7316F72}" srcOrd="0" destOrd="0" presId="urn:microsoft.com/office/officeart/2005/8/layout/default"/>
+    <dgm:cxn modelId="{3B0FAA39-4E4C-41DF-A162-CEB50CBAD7C2}" srcId="{0384B876-2ECC-4919-B753-25BD0C66F198}" destId="{FB1C249E-0A06-4AF8-A1D8-8192523D5D4D}" srcOrd="2" destOrd="0" parTransId="{BAC8DC27-0A0B-426E-AA6F-425FBED8FF75}" sibTransId="{C80A33AA-AB0B-4227-AD61-88D1649B04D3}"/>
     <dgm:cxn modelId="{A7FFEF38-97BE-41BF-B8AE-0CD816FDD651}" type="presOf" srcId="{81B9B0D2-EE58-4F52-BE6A-0FE35ABF75FE}" destId="{2F9A0571-2654-40D2-B1E4-83656F8BD15B}" srcOrd="0" destOrd="0" presId="urn:microsoft.com/office/officeart/2005/8/layout/default"/>
-    <dgm:cxn modelId="{3B0FAA39-4E4C-41DF-A162-CEB50CBAD7C2}" srcId="{0384B876-2ECC-4919-B753-25BD0C66F198}" destId="{FB1C249E-0A06-4AF8-A1D8-8192523D5D4D}" srcOrd="2" destOrd="0" parTransId="{BAC8DC27-0A0B-426E-AA6F-425FBED8FF75}" sibTransId="{C80A33AA-AB0B-4227-AD61-88D1649B04D3}"/>
-    <dgm:cxn modelId="{078C2B51-388D-46E5-BB64-2AA7C66006D5}" type="presOf" srcId="{6CFEA388-2E94-447E-B0E1-80804056BD92}" destId="{3FCBF05D-58D0-4BFE-87DA-7444BE66C628}" srcOrd="0" destOrd="0" presId="urn:microsoft.com/office/officeart/2005/8/layout/default"/>
-    <dgm:cxn modelId="{D499FC5A-B01B-4007-8250-8F168C7BB7D6}" srcId="{0384B876-2ECC-4919-B753-25BD0C66F198}" destId="{AF3DF9F4-2547-4323-B7D7-223C19B1A43A}" srcOrd="3" destOrd="0" parTransId="{D5068AA7-6823-402F-9C06-9492234072B7}" sibTransId="{1C6C65F7-F2D5-4F78-8A20-3989422C7660}"/>
-    <dgm:cxn modelId="{025C377F-4935-417A-9A5D-FC4860EFD2F5}" srcId="{0384B876-2ECC-4919-B753-25BD0C66F198}" destId="{F84DD07E-9DDD-4BF1-BF02-EA5563981EB3}" srcOrd="4" destOrd="0" parTransId="{363FCB3A-DF12-4A87-8A56-2ACF724EB491}" sibTransId="{ECAB8671-FE98-41ED-838E-B6D05E2E2709}"/>
-    <dgm:cxn modelId="{46A07189-BF6E-4EA8-BA41-4D7557AF2E56}" type="presOf" srcId="{F84DD07E-9DDD-4BF1-BF02-EA5563981EB3}" destId="{C5F34CE7-E4CD-4EF7-B1F5-84C0C7316F72}" srcOrd="0" destOrd="0" presId="urn:microsoft.com/office/officeart/2005/8/layout/default"/>
-    <dgm:cxn modelId="{10635F91-5178-4E57-B4B1-998F80B1CD48}" type="presOf" srcId="{0384B876-2ECC-4919-B753-25BD0C66F198}" destId="{72143920-807F-4689-9FF9-372E7A4C34A5}" srcOrd="0" destOrd="0" presId="urn:microsoft.com/office/officeart/2005/8/layout/default"/>
-    <dgm:cxn modelId="{5D3596A7-9835-4853-98F2-5F8BFF73DF51}" type="presOf" srcId="{AF3DF9F4-2547-4323-B7D7-223C19B1A43A}" destId="{1F9EEC6F-3643-44F5-8D03-9E682034BCE1}" srcOrd="0" destOrd="0" presId="urn:microsoft.com/office/officeart/2005/8/layout/default"/>
     <dgm:cxn modelId="{2487EBA9-C8AF-4A63-845F-1A9E19993F2C}" type="presOf" srcId="{2594A9AC-59B6-4608-9FA1-703CC267B66D}" destId="{9BBF94A0-91A5-4000-9011-F55167E37717}" srcOrd="0" destOrd="0" presId="urn:microsoft.com/office/officeart/2005/8/layout/default"/>
-    <dgm:cxn modelId="{19259FAF-C165-48E4-A188-55C12DDD5035}" type="presOf" srcId="{FB1C249E-0A06-4AF8-A1D8-8192523D5D4D}" destId="{18216488-6ABF-4A95-B7DD-ED3E43E96631}" srcOrd="0" destOrd="0" presId="urn:microsoft.com/office/officeart/2005/8/layout/default"/>
-    <dgm:cxn modelId="{719AC4BF-B886-4E5F-B8AD-B80D4D8FCDB7}" srcId="{0384B876-2ECC-4919-B753-25BD0C66F198}" destId="{2594A9AC-59B6-4608-9FA1-703CC267B66D}" srcOrd="6" destOrd="0" parTransId="{9464DEFE-492B-41A7-B7FD-5DC002714510}" sibTransId="{170ECE72-2A32-475B-9209-DAA952965592}"/>
     <dgm:cxn modelId="{A16EBF57-C090-4CB7-9DF5-B963BC4F7512}" type="presParOf" srcId="{72143920-807F-4689-9FF9-372E7A4C34A5}" destId="{2F9A0571-2654-40D2-B1E4-83656F8BD15B}" srcOrd="0" destOrd="0" presId="urn:microsoft.com/office/officeart/2005/8/layout/default"/>
     <dgm:cxn modelId="{B409B2CD-37BE-4908-8381-CFE2F3B5C4C4}" type="presParOf" srcId="{72143920-807F-4689-9FF9-372E7A4C34A5}" destId="{A1C05025-7CC5-4A9D-B1C6-4656762C6D5D}" srcOrd="1" destOrd="0" presId="urn:microsoft.com/office/officeart/2005/8/layout/default"/>
     <dgm:cxn modelId="{4AF53098-088D-43F7-8357-0C7D41571BCA}" type="presParOf" srcId="{72143920-807F-4689-9FF9-372E7A4C34A5}" destId="{3FCBF05D-58D0-4BFE-87DA-7444BE66C628}" srcOrd="2" destOrd="0" presId="urn:microsoft.com/office/officeart/2005/8/layout/default"/>
@@ -1374,7 +1430,7 @@
         </a:bodyPr>
         <a:lstStyle/>
         <a:p>
-          <a:pPr marL="0" lvl="0" indent="0" algn="ctr" defTabSz="1200150">
+          <a:pPr lvl="0" algn="ctr" defTabSz="1200150">
             <a:lnSpc>
               <a:spcPct val="90000"/>
             </a:lnSpc>
@@ -1384,7 +1440,6 @@
             <a:spcAft>
               <a:spcPct val="35000"/>
             </a:spcAft>
-            <a:buNone/>
           </a:pPr>
           <a:r>
             <a:rPr lang="en-US" sz="2700" kern="1200" dirty="0"/>
@@ -1452,7 +1507,7 @@
         </a:bodyPr>
         <a:lstStyle/>
         <a:p>
-          <a:pPr marL="0" lvl="0" indent="0" algn="ctr" defTabSz="1200150">
+          <a:pPr lvl="0" algn="ctr" defTabSz="1200150">
             <a:lnSpc>
               <a:spcPct val="90000"/>
             </a:lnSpc>
@@ -1462,7 +1517,6 @@
             <a:spcAft>
               <a:spcPct val="35000"/>
             </a:spcAft>
-            <a:buNone/>
           </a:pPr>
           <a:r>
             <a:rPr lang="en-US" sz="2700" kern="1200"/>
@@ -1531,7 +1585,7 @@
         </a:bodyPr>
         <a:lstStyle/>
         <a:p>
-          <a:pPr marL="0" lvl="0" indent="0" algn="ctr" defTabSz="1200150">
+          <a:pPr lvl="0" algn="ctr" defTabSz="1200150">
             <a:lnSpc>
               <a:spcPct val="90000"/>
             </a:lnSpc>
@@ -1541,7 +1595,6 @@
             <a:spcAft>
               <a:spcPct val="35000"/>
             </a:spcAft>
-            <a:buNone/>
           </a:pPr>
           <a:r>
             <a:rPr lang="en-US" sz="2700" kern="1200"/>
@@ -1610,7 +1663,7 @@
         </a:bodyPr>
         <a:lstStyle/>
         <a:p>
-          <a:pPr marL="0" lvl="0" indent="0" algn="ctr" defTabSz="1200150">
+          <a:pPr lvl="0" algn="ctr" defTabSz="1200150">
             <a:lnSpc>
               <a:spcPct val="90000"/>
             </a:lnSpc>
@@ -1620,7 +1673,6 @@
             <a:spcAft>
               <a:spcPct val="35000"/>
             </a:spcAft>
-            <a:buNone/>
           </a:pPr>
           <a:r>
             <a:rPr lang="en-US" sz="2700" kern="1200"/>
@@ -1689,7 +1741,7 @@
         </a:bodyPr>
         <a:lstStyle/>
         <a:p>
-          <a:pPr marL="0" lvl="0" indent="0" algn="ctr" defTabSz="1200150">
+          <a:pPr lvl="0" algn="ctr" defTabSz="1200150">
             <a:lnSpc>
               <a:spcPct val="90000"/>
             </a:lnSpc>
@@ -1699,7 +1751,6 @@
             <a:spcAft>
               <a:spcPct val="35000"/>
             </a:spcAft>
-            <a:buNone/>
           </a:pPr>
           <a:r>
             <a:rPr lang="en-US" sz="2700" kern="1200"/>
@@ -1768,7 +1819,7 @@
         </a:bodyPr>
         <a:lstStyle/>
         <a:p>
-          <a:pPr marL="0" lvl="0" indent="0" algn="ctr" defTabSz="1200150">
+          <a:pPr lvl="0" algn="ctr" defTabSz="1200150">
             <a:lnSpc>
               <a:spcPct val="90000"/>
             </a:lnSpc>
@@ -1778,7 +1829,6 @@
             <a:spcAft>
               <a:spcPct val="35000"/>
             </a:spcAft>
-            <a:buNone/>
           </a:pPr>
           <a:r>
             <a:rPr lang="en-US" sz="2700" kern="1200"/>
@@ -1847,7 +1897,7 @@
         </a:bodyPr>
         <a:lstStyle/>
         <a:p>
-          <a:pPr marL="0" lvl="0" indent="0" algn="ctr" defTabSz="1200150">
+          <a:pPr lvl="0" algn="ctr" defTabSz="1200150">
             <a:lnSpc>
               <a:spcPct val="90000"/>
             </a:lnSpc>
@@ -1857,7 +1907,6 @@
             <a:spcAft>
               <a:spcPct val="35000"/>
             </a:spcAft>
-            <a:buNone/>
           </a:pPr>
           <a:r>
             <a:rPr lang="en-US" sz="2700" kern="1200" dirty="0"/>
@@ -3137,7 +3186,7 @@
           <a:p>
             <a:fld id="{474BF7EF-1EA4-4DCA-904E-B0D2B126DB37}" type="datetimeFigureOut">
               <a:rPr lang="en-IN" smtClean="0"/>
-              <a:t>07-04-2020</a:t>
+              <a:t>13-04-2020</a:t>
             </a:fld>
             <a:endParaRPr lang="en-IN"/>
           </a:p>
@@ -3536,7 +3585,7 @@
           <a:p>
             <a:fld id="{05AAA53E-2CEC-432F-AB38-D832A0A94554}" type="datetime1">
               <a:rPr lang="en-IN" smtClean="0"/>
-              <a:t>07-04-2020</a:t>
+              <a:t>13-04-2020</a:t>
             </a:fld>
             <a:endParaRPr lang="en-IN"/>
           </a:p>
@@ -3710,7 +3759,7 @@
           <a:p>
             <a:fld id="{917A918D-8E35-4F01-8506-A25637E225EA}" type="datetime1">
               <a:rPr lang="en-IN" smtClean="0"/>
-              <a:t>07-04-2020</a:t>
+              <a:t>13-04-2020</a:t>
             </a:fld>
             <a:endParaRPr lang="en-IN"/>
           </a:p>
@@ -3894,7 +3943,7 @@
           <a:p>
             <a:fld id="{F4313DCE-C62A-4CAA-9A36-F24F802865E6}" type="datetime1">
               <a:rPr lang="en-IN" smtClean="0"/>
-              <a:t>07-04-2020</a:t>
+              <a:t>13-04-2020</a:t>
             </a:fld>
             <a:endParaRPr lang="en-IN"/>
           </a:p>
@@ -4096,7 +4145,7 @@
           <a:p>
             <a:fld id="{C3A9152F-C09D-4786-A0F4-B4122D753707}" type="datetime1">
               <a:rPr lang="en-IN" smtClean="0"/>
-              <a:t>07-04-2020</a:t>
+              <a:t>13-04-2020</a:t>
             </a:fld>
             <a:endParaRPr lang="en-IN"/>
           </a:p>
@@ -4415,7 +4464,7 @@
           <a:p>
             <a:fld id="{5799543D-C50C-4A13-B434-606596F5FB5B}" type="datetime1">
               <a:rPr lang="en-IN" smtClean="0"/>
-              <a:t>07-04-2020</a:t>
+              <a:t>13-04-2020</a:t>
             </a:fld>
             <a:endParaRPr lang="en-IN"/>
           </a:p>
@@ -4651,7 +4700,7 @@
           <a:p>
             <a:fld id="{988264A6-BF3D-43D2-81F3-1E423F624F52}" type="datetime1">
               <a:rPr lang="en-IN" smtClean="0"/>
-              <a:t>07-04-2020</a:t>
+              <a:t>13-04-2020</a:t>
             </a:fld>
             <a:endParaRPr lang="en-IN"/>
           </a:p>
@@ -5022,7 +5071,7 @@
           <a:p>
             <a:fld id="{3064F0BE-DF75-49AE-8E52-F40850A18A2A}" type="datetime1">
               <a:rPr lang="en-IN" smtClean="0"/>
-              <a:t>07-04-2020</a:t>
+              <a:t>13-04-2020</a:t>
             </a:fld>
             <a:endParaRPr lang="en-IN"/>
           </a:p>
@@ -5144,7 +5193,7 @@
           <a:p>
             <a:fld id="{17040B1E-F0B2-4E88-A55C-BBD7E911897B}" type="datetime1">
               <a:rPr lang="en-IN" smtClean="0"/>
-              <a:t>07-04-2020</a:t>
+              <a:t>13-04-2020</a:t>
             </a:fld>
             <a:endParaRPr lang="en-IN"/>
           </a:p>
@@ -5243,7 +5292,7 @@
           <a:p>
             <a:fld id="{A8CFD1AA-10A9-4BEF-938B-6DB01D121D0A}" type="datetime1">
               <a:rPr lang="en-IN" smtClean="0"/>
-              <a:t>07-04-2020</a:t>
+              <a:t>13-04-2020</a:t>
             </a:fld>
             <a:endParaRPr lang="en-IN"/>
           </a:p>
@@ -5524,7 +5573,7 @@
           <a:p>
             <a:fld id="{012C2F38-703D-4021-8649-85E07EEF35ED}" type="datetime1">
               <a:rPr lang="en-IN" smtClean="0"/>
-              <a:t>07-04-2020</a:t>
+              <a:t>13-04-2020</a:t>
             </a:fld>
             <a:endParaRPr lang="en-IN"/>
           </a:p>
@@ -5781,7 +5830,7 @@
           <a:p>
             <a:fld id="{CAC2FC3E-2418-456B-BC94-972C16EB127E}" type="datetime1">
               <a:rPr lang="en-IN" smtClean="0"/>
-              <a:t>07-04-2020</a:t>
+              <a:t>13-04-2020</a:t>
             </a:fld>
             <a:endParaRPr lang="en-IN"/>
           </a:p>
@@ -5998,7 +6047,7 @@
           <a:p>
             <a:fld id="{D4148EA8-9EB1-46F8-8002-146212B7C5A5}" type="datetime1">
               <a:rPr lang="en-IN" smtClean="0"/>
-              <a:t>07-04-2020</a:t>
+              <a:t>13-04-2020</a:t>
             </a:fld>
             <a:endParaRPr lang="en-IN"/>
           </a:p>
@@ -6488,6 +6537,10 @@
               <a:rPr lang="en-US" sz="2400" b="1" dirty="0"/>
               <a:t>Natural Language Processing (NLP) Application Capstone Project</a:t>
             </a:r>
+            <a:r>
+              <a:rPr lang="en-IN" sz="2400" dirty="0"/>
+              <a:t/>
+            </a:r>
             <a:br>
               <a:rPr lang="en-IN" sz="2400" dirty="0"/>
             </a:br>
@@ -6596,10 +6649,10 @@
               <a:t> </a:t>
             </a:r>
             <a:r>
-              <a:rPr lang="en-US" sz="1600" b="1" dirty="0" err="1"/>
+              <a:rPr lang="en-US" sz="1600" b="1" dirty="0" err="1" smtClean="0"/>
               <a:t>Dcosta</a:t>
             </a:r>
-            <a:endParaRPr lang="en-IN" sz="1600" b="1" dirty="0"/>
+            <a:endParaRPr lang="en-US" sz="1600" b="1" dirty="0" smtClean="0"/>
           </a:p>
           <a:p>
             <a:pPr>
@@ -6611,9 +6664,18 @@
               </a:spcBef>
             </a:pPr>
             <a:r>
+              <a:rPr lang="en-US" sz="1600" b="1" dirty="0" err="1"/>
+              <a:t>Kumari</a:t>
+            </a:r>
+            <a:r>
               <a:rPr lang="en-US" sz="1600" b="1" dirty="0"/>
-              <a:t>Lavanya Harry Pandian</a:t>
-            </a:r>
+              <a:t> </a:t>
+            </a:r>
+            <a:r>
+              <a:rPr lang="en-US" sz="1600" b="1" dirty="0" err="1"/>
+              <a:t>Pallavi</a:t>
+            </a:r>
+            <a:endParaRPr lang="en-IN" sz="1600" b="1" dirty="0"/>
           </a:p>
           <a:p>
             <a:pPr>
@@ -6626,9 +6688,8 @@
             </a:pPr>
             <a:r>
               <a:rPr lang="en-US" sz="1600" b="1" dirty="0"/>
-              <a:t>Pallavi Kumari</a:t>
-            </a:r>
-            <a:endParaRPr lang="en-IN" sz="1600" b="1" dirty="0"/>
+              <a:t>Lavanya Harry Pandian</a:t>
+            </a:r>
           </a:p>
           <a:p>
             <a:pPr>
@@ -6640,8 +6701,12 @@
               </a:spcBef>
             </a:pPr>
             <a:r>
+              <a:rPr lang="en-US" sz="1600" b="1" dirty="0" smtClean="0"/>
+              <a:t>Swati </a:t>
+            </a:r>
+            <a:r>
               <a:rPr lang="en-US" sz="1600" b="1" dirty="0"/>
-              <a:t>Swati Tyagi</a:t>
+              <a:t>Tyagi</a:t>
             </a:r>
           </a:p>
           <a:p>

</xml_diff>